<commit_message>
fix Anakin size bugs
</commit_message>
<xml_diff>
--- a/doc/TensileConv 2019-02.PPTX
+++ b/doc/TensileConv 2019-02.PPTX
@@ -6,10 +6,10 @@
     <p:sldMasterId id="2147484026" r:id="rId5"/>
   </p:sldMasterIdLst>
   <p:notesMasterIdLst>
-    <p:notesMasterId r:id="rId15"/>
+    <p:notesMasterId r:id="rId16"/>
   </p:notesMasterIdLst>
   <p:handoutMasterIdLst>
-    <p:handoutMasterId r:id="rId16"/>
+    <p:handoutMasterId r:id="rId17"/>
   </p:handoutMasterIdLst>
   <p:sldIdLst>
     <p:sldId id="298" r:id="rId6"/>
@@ -19,8 +19,9 @@
     <p:sldId id="387" r:id="rId10"/>
     <p:sldId id="389" r:id="rId11"/>
     <p:sldId id="386" r:id="rId12"/>
-    <p:sldId id="381" r:id="rId13"/>
-    <p:sldId id="390" r:id="rId14"/>
+    <p:sldId id="392" r:id="rId13"/>
+    <p:sldId id="391" r:id="rId14"/>
+    <p:sldId id="390" r:id="rId15"/>
   </p:sldIdLst>
   <p:sldSz cx="12188825" cy="6858000"/>
   <p:notesSz cx="7102475" cy="9388475"/>
@@ -3966,7 +3967,7 @@
               <a:pPr>
                 <a:defRPr/>
               </a:pPr>
-              <a:t>2/26/2019</a:t>
+              <a:t>3/8/2019</a:t>
             </a:fld>
             <a:endParaRPr lang="en-US"/>
           </a:p>
@@ -4187,7 +4188,7 @@
               <a:pPr>
                 <a:defRPr/>
               </a:pPr>
-              <a:t>2/26/2019</a:t>
+              <a:t>3/8/2019</a:t>
             </a:fld>
             <a:endParaRPr lang="en-US"/>
           </a:p>
@@ -5273,7 +5274,7 @@
     </p:spTree>
     <p:extLst>
       <p:ext uri="{BB962C8B-B14F-4D97-AF65-F5344CB8AC3E}">
-        <p14:creationId xmlns:p14="http://schemas.microsoft.com/office/powerpoint/2010/main" val="1406118858"/>
+        <p14:creationId xmlns:p14="http://schemas.microsoft.com/office/powerpoint/2010/main" val="152878806"/>
       </p:ext>
     </p:extLst>
   </p:cSld>
@@ -5284,6 +5285,115 @@
 </file>
 
 <file path=ppt/notesSlides/notesSlide8.xml><?xml version="1.0" encoding="utf-8"?>
+<p:notes xmlns:a="http://schemas.openxmlformats.org/drawingml/2006/main" xmlns:r="http://schemas.openxmlformats.org/officeDocument/2006/relationships" xmlns:p="http://schemas.openxmlformats.org/presentationml/2006/main">
+  <p:cSld>
+    <p:spTree>
+      <p:nvGrpSpPr>
+        <p:cNvPr id="1" name=""/>
+        <p:cNvGrpSpPr/>
+        <p:nvPr/>
+      </p:nvGrpSpPr>
+      <p:grpSpPr>
+        <a:xfrm>
+          <a:off x="0" y="0"/>
+          <a:ext cx="0" cy="0"/>
+          <a:chOff x="0" y="0"/>
+          <a:chExt cx="0" cy="0"/>
+        </a:xfrm>
+      </p:grpSpPr>
+      <p:sp>
+        <p:nvSpPr>
+          <p:cNvPr id="48130" name="Slide Image Placeholder 1"/>
+          <p:cNvSpPr>
+            <a:spLocks noGrp="1" noRot="1" noChangeAspect="1" noTextEdit="1"/>
+          </p:cNvSpPr>
+          <p:nvPr>
+            <p:ph type="sldImg"/>
+          </p:nvPr>
+        </p:nvSpPr>
+        <p:spPr bwMode="auto">
+          <a:noFill/>
+          <a:ln>
+            <a:solidFill>
+              <a:srgbClr val="000000"/>
+            </a:solidFill>
+            <a:miter lim="800000"/>
+            <a:headEnd/>
+            <a:tailEnd/>
+          </a:ln>
+          <a:extLst>
+            <a:ext uri="{909E8E84-426E-40DD-AFC4-6F175D3DCCD1}">
+              <a14:hiddenFill xmlns:a14="http://schemas.microsoft.com/office/drawing/2010/main">
+                <a:solidFill>
+                  <a:srgbClr val="FFFFFF"/>
+                </a:solidFill>
+              </a14:hiddenFill>
+            </a:ext>
+          </a:extLst>
+        </p:spPr>
+      </p:sp>
+      <p:sp>
+        <p:nvSpPr>
+          <p:cNvPr id="48131" name="Notes Placeholder 2"/>
+          <p:cNvSpPr>
+            <a:spLocks noGrp="1"/>
+          </p:cNvSpPr>
+          <p:nvPr>
+            <p:ph type="body" idx="1"/>
+          </p:nvPr>
+        </p:nvSpPr>
+        <p:spPr bwMode="auto">
+          <a:noFill/>
+          <a:extLst>
+            <a:ext uri="{909E8E84-426E-40DD-AFC4-6F175D3DCCD1}">
+              <a14:hiddenFill xmlns:a14="http://schemas.microsoft.com/office/drawing/2010/main">
+                <a:solidFill>
+                  <a:srgbClr val="FFFFFF"/>
+                </a:solidFill>
+              </a14:hiddenFill>
+            </a:ext>
+            <a:ext uri="{91240B29-F687-4F45-9708-019B960494DF}">
+              <a14:hiddenLine xmlns:a14="http://schemas.microsoft.com/office/drawing/2010/main" w="9525">
+                <a:solidFill>
+                  <a:srgbClr val="000000"/>
+                </a:solidFill>
+                <a:miter lim="800000"/>
+                <a:headEnd/>
+                <a:tailEnd/>
+              </a14:hiddenLine>
+            </a:ext>
+          </a:extLst>
+        </p:spPr>
+        <p:txBody>
+          <a:bodyPr wrap="square" numCol="1" anchor="t" anchorCtr="0" compatLnSpc="1">
+            <a:prstTxWarp prst="textNoShape">
+              <a:avLst/>
+            </a:prstTxWarp>
+          </a:bodyPr>
+          <a:lstStyle/>
+          <a:p>
+            <a:pPr marL="0" indent="0">
+              <a:buFont typeface="Wingdings 3" panose="05040102010807070707" pitchFamily="18" charset="2"/>
+              <a:buNone/>
+            </a:pPr>
+            <a:endParaRPr lang="en-US"/>
+          </a:p>
+        </p:txBody>
+      </p:sp>
+    </p:spTree>
+    <p:extLst>
+      <p:ext uri="{BB962C8B-B14F-4D97-AF65-F5344CB8AC3E}">
+        <p14:creationId xmlns:p14="http://schemas.microsoft.com/office/powerpoint/2010/main" val="2352116253"/>
+      </p:ext>
+    </p:extLst>
+  </p:cSld>
+  <p:clrMapOvr>
+    <a:masterClrMapping/>
+  </p:clrMapOvr>
+</p:notes>
+</file>
+
+<file path=ppt/notesSlides/notesSlide9.xml><?xml version="1.0" encoding="utf-8"?>
 <p:notes xmlns:a="http://schemas.openxmlformats.org/drawingml/2006/main" xmlns:r="http://schemas.openxmlformats.org/officeDocument/2006/relationships" xmlns:p="http://schemas.openxmlformats.org/presentationml/2006/main">
   <p:cSld>
     <p:spTree>
@@ -11148,7 +11258,7 @@
                 </a:spcAft>
                 <a:defRPr/>
               </a:pPr>
-              <a:t>February 26, 2019</a:t>
+              <a:t>March 8, 2019</a:t>
             </a:fld>
             <a:r>
               <a:rPr lang="en-US" sz="1000" cap="all" dirty="0"/>
@@ -11961,7 +12071,7 @@
                 </a:spcAft>
                 <a:defRPr/>
               </a:pPr>
-              <a:t>February 26, 2019</a:t>
+              <a:t>March 8, 2019</a:t>
             </a:fld>
             <a:r>
               <a:rPr lang="en-US" sz="1000" cap="all" dirty="0">
@@ -12601,6 +12711,486 @@
 </p:sld>
 </file>
 
+<file path=ppt/slides/slide10.xml><?xml version="1.0" encoding="utf-8"?>
+<p:sld xmlns:a="http://schemas.openxmlformats.org/drawingml/2006/main" xmlns:r="http://schemas.openxmlformats.org/officeDocument/2006/relationships" xmlns:p="http://schemas.openxmlformats.org/presentationml/2006/main">
+  <p:cSld>
+    <p:spTree>
+      <p:nvGrpSpPr>
+        <p:cNvPr id="1" name=""/>
+        <p:cNvGrpSpPr/>
+        <p:nvPr/>
+      </p:nvGrpSpPr>
+      <p:grpSpPr>
+        <a:xfrm>
+          <a:off x="0" y="0"/>
+          <a:ext cx="0" cy="0"/>
+          <a:chOff x="0" y="0"/>
+          <a:chExt cx="0" cy="0"/>
+        </a:xfrm>
+      </p:grpSpPr>
+      <p:sp>
+        <p:nvSpPr>
+          <p:cNvPr id="10" name="Title 4"/>
+          <p:cNvSpPr txBox="1">
+            <a:spLocks/>
+          </p:cNvSpPr>
+          <p:nvPr/>
+        </p:nvSpPr>
+        <p:spPr>
+          <a:xfrm>
+            <a:off x="428514" y="110404"/>
+            <a:ext cx="11331798" cy="545234"/>
+          </a:xfrm>
+          <a:prstGeom prst="rect">
+            <a:avLst/>
+          </a:prstGeom>
+        </p:spPr>
+        <p:txBody>
+          <a:bodyPr/>
+          <a:lstStyle>
+            <a:lvl1pPr algn="l" defTabSz="912813" rtl="0" eaLnBrk="0" fontAlgn="base" hangingPunct="0">
+              <a:spcBef>
+                <a:spcPct val="0"/>
+              </a:spcBef>
+              <a:spcAft>
+                <a:spcPct val="0"/>
+              </a:spcAft>
+              <a:defRPr lang="en-US" sz="2200" b="1" i="1" kern="1200" cap="all" dirty="0">
+                <a:solidFill>
+                  <a:schemeClr val="tx2"/>
+                </a:solidFill>
+                <a:latin typeface="Arial" pitchFamily="34" charset="0"/>
+                <a:ea typeface="+mj-ea"/>
+                <a:cs typeface="Arial" pitchFamily="34" charset="0"/>
+              </a:defRPr>
+            </a:lvl1pPr>
+            <a:lvl2pPr algn="l" defTabSz="912813" rtl="0" eaLnBrk="0" fontAlgn="base" hangingPunct="0">
+              <a:spcBef>
+                <a:spcPct val="0"/>
+              </a:spcBef>
+              <a:spcAft>
+                <a:spcPct val="0"/>
+              </a:spcAft>
+              <a:defRPr sz="2200" b="1" i="1">
+                <a:solidFill>
+                  <a:schemeClr val="tx2"/>
+                </a:solidFill>
+                <a:latin typeface="Arial" charset="0"/>
+                <a:cs typeface="Arial" charset="0"/>
+              </a:defRPr>
+            </a:lvl2pPr>
+            <a:lvl3pPr algn="l" defTabSz="912813" rtl="0" eaLnBrk="0" fontAlgn="base" hangingPunct="0">
+              <a:spcBef>
+                <a:spcPct val="0"/>
+              </a:spcBef>
+              <a:spcAft>
+                <a:spcPct val="0"/>
+              </a:spcAft>
+              <a:defRPr sz="2200" b="1" i="1">
+                <a:solidFill>
+                  <a:schemeClr val="tx2"/>
+                </a:solidFill>
+                <a:latin typeface="Arial" charset="0"/>
+                <a:cs typeface="Arial" charset="0"/>
+              </a:defRPr>
+            </a:lvl3pPr>
+            <a:lvl4pPr algn="l" defTabSz="912813" rtl="0" eaLnBrk="0" fontAlgn="base" hangingPunct="0">
+              <a:spcBef>
+                <a:spcPct val="0"/>
+              </a:spcBef>
+              <a:spcAft>
+                <a:spcPct val="0"/>
+              </a:spcAft>
+              <a:defRPr sz="2200" b="1" i="1">
+                <a:solidFill>
+                  <a:schemeClr val="tx2"/>
+                </a:solidFill>
+                <a:latin typeface="Arial" charset="0"/>
+                <a:cs typeface="Arial" charset="0"/>
+              </a:defRPr>
+            </a:lvl4pPr>
+            <a:lvl5pPr algn="l" defTabSz="912813" rtl="0" eaLnBrk="0" fontAlgn="base" hangingPunct="0">
+              <a:spcBef>
+                <a:spcPct val="0"/>
+              </a:spcBef>
+              <a:spcAft>
+                <a:spcPct val="0"/>
+              </a:spcAft>
+              <a:defRPr sz="2200" b="1" i="1">
+                <a:solidFill>
+                  <a:schemeClr val="tx2"/>
+                </a:solidFill>
+                <a:latin typeface="Arial" charset="0"/>
+                <a:cs typeface="Arial" charset="0"/>
+              </a:defRPr>
+            </a:lvl5pPr>
+            <a:lvl6pPr marL="457200" algn="l" defTabSz="912813" rtl="0" fontAlgn="base">
+              <a:spcBef>
+                <a:spcPct val="0"/>
+              </a:spcBef>
+              <a:spcAft>
+                <a:spcPct val="0"/>
+              </a:spcAft>
+              <a:defRPr sz="2200" b="1" i="1">
+                <a:solidFill>
+                  <a:schemeClr val="tx2"/>
+                </a:solidFill>
+                <a:latin typeface="Arial" charset="0"/>
+                <a:cs typeface="Arial" charset="0"/>
+              </a:defRPr>
+            </a:lvl6pPr>
+            <a:lvl7pPr marL="914400" algn="l" defTabSz="912813" rtl="0" fontAlgn="base">
+              <a:spcBef>
+                <a:spcPct val="0"/>
+              </a:spcBef>
+              <a:spcAft>
+                <a:spcPct val="0"/>
+              </a:spcAft>
+              <a:defRPr sz="2200" b="1" i="1">
+                <a:solidFill>
+                  <a:schemeClr val="tx2"/>
+                </a:solidFill>
+                <a:latin typeface="Arial" charset="0"/>
+                <a:cs typeface="Arial" charset="0"/>
+              </a:defRPr>
+            </a:lvl7pPr>
+            <a:lvl8pPr marL="1371600" algn="l" defTabSz="912813" rtl="0" fontAlgn="base">
+              <a:spcBef>
+                <a:spcPct val="0"/>
+              </a:spcBef>
+              <a:spcAft>
+                <a:spcPct val="0"/>
+              </a:spcAft>
+              <a:defRPr sz="2200" b="1" i="1">
+                <a:solidFill>
+                  <a:schemeClr val="tx2"/>
+                </a:solidFill>
+                <a:latin typeface="Arial" charset="0"/>
+                <a:cs typeface="Arial" charset="0"/>
+              </a:defRPr>
+            </a:lvl8pPr>
+            <a:lvl9pPr marL="1828800" algn="l" defTabSz="912813" rtl="0" fontAlgn="base">
+              <a:spcBef>
+                <a:spcPct val="0"/>
+              </a:spcBef>
+              <a:spcAft>
+                <a:spcPct val="0"/>
+              </a:spcAft>
+              <a:defRPr sz="2200" b="1" i="1">
+                <a:solidFill>
+                  <a:schemeClr val="tx2"/>
+                </a:solidFill>
+                <a:latin typeface="Arial" charset="0"/>
+                <a:cs typeface="Arial" charset="0"/>
+              </a:defRPr>
+            </a:lvl9pPr>
+          </a:lstStyle>
+          <a:p>
+            <a:pPr>
+              <a:defRPr/>
+            </a:pPr>
+            <a:r>
+              <a:rPr lang="en-US" altLang="zh-CN" sz="2600" i="0" dirty="0">
+                <a:solidFill>
+                  <a:schemeClr val="tx1"/>
+                </a:solidFill>
+                <a:latin typeface="Calibri" pitchFamily="34" charset="0"/>
+                <a:cs typeface="+mj-cs"/>
+              </a:rPr>
+              <a:t>Only for fun – remote GUI  </a:t>
+            </a:r>
+            <a:endParaRPr lang="en-US" sz="2600" i="0" dirty="0">
+              <a:solidFill>
+                <a:schemeClr val="tx1"/>
+              </a:solidFill>
+              <a:latin typeface="Calibri" pitchFamily="34" charset="0"/>
+              <a:cs typeface="+mj-cs"/>
+            </a:endParaRPr>
+          </a:p>
+        </p:txBody>
+      </p:sp>
+      <p:sp>
+        <p:nvSpPr>
+          <p:cNvPr id="7" name="Content Placeholder 2">
+            <a:extLst>
+              <a:ext uri="{FF2B5EF4-FFF2-40B4-BE49-F238E27FC236}">
+                <a16:creationId xmlns:a16="http://schemas.microsoft.com/office/drawing/2014/main" id="{2A2C9B03-5BE1-4511-AC15-56D68EF411D5}"/>
+              </a:ext>
+            </a:extLst>
+          </p:cNvPr>
+          <p:cNvSpPr txBox="1">
+            <a:spLocks/>
+          </p:cNvSpPr>
+          <p:nvPr/>
+        </p:nvSpPr>
+        <p:spPr bwMode="auto">
+          <a:xfrm>
+            <a:off x="308227" y="655637"/>
+            <a:ext cx="11331798" cy="5824675"/>
+          </a:xfrm>
+          <a:prstGeom prst="rect">
+            <a:avLst/>
+          </a:prstGeom>
+          <a:noFill/>
+          <a:ln>
+            <a:noFill/>
+          </a:ln>
+          <a:extLst>
+            <a:ext uri="{909E8E84-426E-40DD-AFC4-6F175D3DCCD1}">
+              <a14:hiddenFill xmlns:a14="http://schemas.microsoft.com/office/drawing/2010/main">
+                <a:solidFill>
+                  <a:srgbClr val="FFFFFF"/>
+                </a:solidFill>
+              </a14:hiddenFill>
+            </a:ext>
+            <a:ext uri="{91240B29-F687-4F45-9708-019B960494DF}">
+              <a14:hiddenLine xmlns:a14="http://schemas.microsoft.com/office/drawing/2010/main" w="9525">
+                <a:solidFill>
+                  <a:srgbClr val="000000"/>
+                </a:solidFill>
+                <a:miter lim="800000"/>
+                <a:headEnd/>
+                <a:tailEnd/>
+              </a14:hiddenLine>
+            </a:ext>
+          </a:extLst>
+        </p:spPr>
+        <p:txBody>
+          <a:bodyPr vert="horz" wrap="square" lIns="0" tIns="45720" rIns="0" bIns="45720" numCol="1" anchor="t" anchorCtr="0" compatLnSpc="1">
+            <a:prstTxWarp prst="textNoShape">
+              <a:avLst/>
+            </a:prstTxWarp>
+            <a:noAutofit/>
+          </a:bodyPr>
+          <a:lstStyle>
+            <a:lvl1pPr marL="0" indent="0" algn="l" rtl="0" eaLnBrk="0" fontAlgn="base" hangingPunct="0">
+              <a:spcBef>
+                <a:spcPts val="800"/>
+              </a:spcBef>
+              <a:spcAft>
+                <a:spcPct val="0"/>
+              </a:spcAft>
+              <a:buClr>
+                <a:schemeClr val="tx1"/>
+              </a:buClr>
+              <a:buFont typeface="Wingdings 3" panose="05040102010807070707" pitchFamily="18" charset="2"/>
+              <a:buNone/>
+              <a:defRPr sz="1999" b="1" kern="1200">
+                <a:solidFill>
+                  <a:schemeClr val="tx1"/>
+                </a:solidFill>
+                <a:latin typeface="Calibri" pitchFamily="34" charset="0"/>
+                <a:ea typeface="+mn-ea"/>
+                <a:cs typeface="+mn-cs"/>
+              </a:defRPr>
+            </a:lvl1pPr>
+            <a:lvl2pPr marL="457063" indent="0" algn="l" rtl="0" eaLnBrk="0" fontAlgn="base" hangingPunct="0">
+              <a:spcBef>
+                <a:spcPts val="300"/>
+              </a:spcBef>
+              <a:spcAft>
+                <a:spcPct val="0"/>
+              </a:spcAft>
+              <a:buClr>
+                <a:schemeClr val="tx1"/>
+              </a:buClr>
+              <a:buFont typeface="Calibri" panose="020F0502020204030204" pitchFamily="34" charset="0"/>
+              <a:buNone/>
+              <a:defRPr sz="1999" b="1" kern="1200">
+                <a:solidFill>
+                  <a:schemeClr val="tx1"/>
+                </a:solidFill>
+                <a:latin typeface="Calibri" pitchFamily="34" charset="0"/>
+                <a:ea typeface="+mn-ea"/>
+                <a:cs typeface="+mn-cs"/>
+              </a:defRPr>
+            </a:lvl2pPr>
+            <a:lvl3pPr marL="914126" indent="0" algn="l" rtl="0" eaLnBrk="0" fontAlgn="base" hangingPunct="0">
+              <a:spcBef>
+                <a:spcPts val="300"/>
+              </a:spcBef>
+              <a:spcAft>
+                <a:spcPct val="0"/>
+              </a:spcAft>
+              <a:buClr>
+                <a:schemeClr val="tx1"/>
+              </a:buClr>
+              <a:buFont typeface="Calibri" panose="020F0502020204030204" pitchFamily="34" charset="0"/>
+              <a:buNone/>
+              <a:defRPr sz="1799" b="1" kern="1200">
+                <a:solidFill>
+                  <a:schemeClr val="tx1"/>
+                </a:solidFill>
+                <a:latin typeface="Calibri" pitchFamily="34" charset="0"/>
+                <a:ea typeface="+mn-ea"/>
+                <a:cs typeface="+mn-cs"/>
+              </a:defRPr>
+            </a:lvl3pPr>
+            <a:lvl4pPr marL="1371189" indent="0" algn="l" rtl="0" eaLnBrk="0" fontAlgn="base" hangingPunct="0">
+              <a:spcBef>
+                <a:spcPts val="300"/>
+              </a:spcBef>
+              <a:spcAft>
+                <a:spcPct val="0"/>
+              </a:spcAft>
+              <a:buClr>
+                <a:schemeClr val="tx1"/>
+              </a:buClr>
+              <a:buFont typeface="Calibri" panose="020F0502020204030204" pitchFamily="34" charset="0"/>
+              <a:buNone/>
+              <a:defRPr sz="1600" b="1" kern="1200">
+                <a:solidFill>
+                  <a:schemeClr val="tx1"/>
+                </a:solidFill>
+                <a:latin typeface="Calibri" pitchFamily="34" charset="0"/>
+                <a:ea typeface="+mn-ea"/>
+                <a:cs typeface="+mn-cs"/>
+              </a:defRPr>
+            </a:lvl4pPr>
+            <a:lvl5pPr marL="1828251" indent="0" algn="l" rtl="0" eaLnBrk="0" fontAlgn="base" hangingPunct="0">
+              <a:spcBef>
+                <a:spcPts val="300"/>
+              </a:spcBef>
+              <a:spcAft>
+                <a:spcPct val="0"/>
+              </a:spcAft>
+              <a:buClr>
+                <a:schemeClr val="tx1"/>
+              </a:buClr>
+              <a:buFont typeface="Calibri" panose="020F0502020204030204" pitchFamily="34" charset="0"/>
+              <a:buNone/>
+              <a:defRPr sz="1600" b="1" kern="1200">
+                <a:solidFill>
+                  <a:schemeClr val="tx1"/>
+                </a:solidFill>
+                <a:latin typeface="Calibri" pitchFamily="34" charset="0"/>
+                <a:ea typeface="+mn-ea"/>
+                <a:cs typeface="+mn-cs"/>
+              </a:defRPr>
+            </a:lvl5pPr>
+            <a:lvl6pPr marL="2285314" indent="0" algn="l" defTabSz="914400" rtl="0" eaLnBrk="1" latinLnBrk="0" hangingPunct="1">
+              <a:spcBef>
+                <a:spcPct val="20000"/>
+              </a:spcBef>
+              <a:buFont typeface="Arial" pitchFamily="34" charset="0"/>
+              <a:buNone/>
+              <a:defRPr sz="1600" b="1" kern="1200">
+                <a:solidFill>
+                  <a:schemeClr val="tx1"/>
+                </a:solidFill>
+                <a:latin typeface="+mn-lt"/>
+                <a:ea typeface="+mn-ea"/>
+                <a:cs typeface="+mn-cs"/>
+              </a:defRPr>
+            </a:lvl6pPr>
+            <a:lvl7pPr marL="2742377" indent="0" algn="l" defTabSz="914400" rtl="0" eaLnBrk="1" latinLnBrk="0" hangingPunct="1">
+              <a:spcBef>
+                <a:spcPct val="20000"/>
+              </a:spcBef>
+              <a:buFont typeface="Arial" pitchFamily="34" charset="0"/>
+              <a:buNone/>
+              <a:defRPr sz="1600" b="1" kern="1200">
+                <a:solidFill>
+                  <a:schemeClr val="tx1"/>
+                </a:solidFill>
+                <a:latin typeface="+mn-lt"/>
+                <a:ea typeface="+mn-ea"/>
+                <a:cs typeface="+mn-cs"/>
+              </a:defRPr>
+            </a:lvl7pPr>
+            <a:lvl8pPr marL="3199440" indent="0" algn="l" defTabSz="914400" rtl="0" eaLnBrk="1" latinLnBrk="0" hangingPunct="1">
+              <a:spcBef>
+                <a:spcPct val="20000"/>
+              </a:spcBef>
+              <a:buFont typeface="Arial" pitchFamily="34" charset="0"/>
+              <a:buNone/>
+              <a:defRPr sz="1600" b="1" kern="1200">
+                <a:solidFill>
+                  <a:schemeClr val="tx1"/>
+                </a:solidFill>
+                <a:latin typeface="+mn-lt"/>
+                <a:ea typeface="+mn-ea"/>
+                <a:cs typeface="+mn-cs"/>
+              </a:defRPr>
+            </a:lvl8pPr>
+            <a:lvl9pPr marL="3656503" indent="0" algn="l" defTabSz="914400" rtl="0" eaLnBrk="1" latinLnBrk="0" hangingPunct="1">
+              <a:spcBef>
+                <a:spcPct val="20000"/>
+              </a:spcBef>
+              <a:buFont typeface="Arial" pitchFamily="34" charset="0"/>
+              <a:buNone/>
+              <a:defRPr sz="1600" b="1" kern="1200">
+                <a:solidFill>
+                  <a:schemeClr val="tx1"/>
+                </a:solidFill>
+                <a:latin typeface="+mn-lt"/>
+                <a:ea typeface="+mn-ea"/>
+                <a:cs typeface="+mn-cs"/>
+              </a:defRPr>
+            </a:lvl9pPr>
+          </a:lstStyle>
+          <a:p>
+            <a:pPr marL="722313" lvl="1" indent="-342900">
+              <a:buFont typeface="Arial" panose="020B0604020202020204" pitchFamily="34" charset="0"/>
+              <a:buChar char="•"/>
+            </a:pPr>
+            <a:endParaRPr lang="en-US" dirty="0"/>
+          </a:p>
+        </p:txBody>
+      </p:sp>
+      <p:pic>
+        <p:nvPicPr>
+          <p:cNvPr id="4" name="Picture 3" descr="TensileConvGUI">
+            <a:extLst>
+              <a:ext uri="{FF2B5EF4-FFF2-40B4-BE49-F238E27FC236}">
+                <a16:creationId xmlns:a16="http://schemas.microsoft.com/office/drawing/2014/main" id="{4CE1FCD0-30F0-46FD-93B6-D13B24D738ED}"/>
+              </a:ext>
+            </a:extLst>
+          </p:cNvPr>
+          <p:cNvPicPr/>
+          <p:nvPr/>
+        </p:nvPicPr>
+        <p:blipFill>
+          <a:blip r:embed="rId3" r:link="rId4">
+            <a:extLst>
+              <a:ext uri="{28A0092B-C50C-407E-A947-70E740481C1C}">
+                <a14:useLocalDpi xmlns:a14="http://schemas.microsoft.com/office/drawing/2010/main" val="0"/>
+              </a:ext>
+            </a:extLst>
+          </a:blip>
+          <a:srcRect/>
+          <a:stretch>
+            <a:fillRect/>
+          </a:stretch>
+        </p:blipFill>
+        <p:spPr bwMode="auto">
+          <a:xfrm>
+            <a:off x="1616292" y="1070072"/>
+            <a:ext cx="8272426" cy="4934801"/>
+          </a:xfrm>
+          <a:prstGeom prst="rect">
+            <a:avLst/>
+          </a:prstGeom>
+          <a:noFill/>
+          <a:ln>
+            <a:noFill/>
+          </a:ln>
+        </p:spPr>
+      </p:pic>
+    </p:spTree>
+    <p:extLst>
+      <p:ext uri="{BB962C8B-B14F-4D97-AF65-F5344CB8AC3E}">
+        <p14:creationId xmlns:p14="http://schemas.microsoft.com/office/powerpoint/2010/main" val="824862506"/>
+      </p:ext>
+    </p:extLst>
+  </p:cSld>
+  <p:clrMapOvr>
+    <a:masterClrMapping/>
+  </p:clrMapOvr>
+  <p:transition/>
+</p:sld>
+</file>
+
 <file path=ppt/slides/slide2.xml><?xml version="1.0" encoding="utf-8"?>
 <p:sld xmlns:a="http://schemas.openxmlformats.org/drawingml/2006/main" xmlns:r="http://schemas.openxmlformats.org/officeDocument/2006/relationships" xmlns:p="http://schemas.openxmlformats.org/presentationml/2006/main">
   <p:cSld>
@@ -12697,7 +13287,14 @@
             <a:pPr eaLnBrk="1" hangingPunct="1"/>
             <a:r>
               <a:rPr lang="en-US" altLang="zh-CN" dirty="0"/>
-              <a:t>Auto Tuning </a:t>
+              <a:t>Auto Tuning</a:t>
+            </a:r>
+          </a:p>
+          <a:p>
+            <a:pPr eaLnBrk="1" hangingPunct="1"/>
+            <a:r>
+              <a:rPr lang="en-US" altLang="zh-CN" dirty="0"/>
+              <a:t>Library and API  </a:t>
             </a:r>
           </a:p>
           <a:p>
@@ -28763,7 +29360,7 @@
         </p:nvSpPr>
         <p:spPr>
           <a:xfrm>
-            <a:off x="428514" y="110403"/>
+            <a:off x="438568" y="110403"/>
             <a:ext cx="11331798" cy="1349429"/>
           </a:xfrm>
           <a:prstGeom prst="rect">
@@ -31976,18 +32573,15 @@
                 <a:latin typeface="Calibri" pitchFamily="34" charset="0"/>
                 <a:cs typeface="+mj-cs"/>
               </a:rPr>
-              <a:t>Future work  </a:t>
+              <a:t>Library and API </a:t>
             </a:r>
-            <a:r>
-              <a:rPr lang="en-US" sz="2600" i="0" dirty="0">
-                <a:solidFill>
-                  <a:schemeClr val="tx1"/>
-                </a:solidFill>
-                <a:latin typeface="Calibri" pitchFamily="34" charset="0"/>
-                <a:cs typeface="+mj-cs"/>
-              </a:rPr>
-              <a:t> </a:t>
-            </a:r>
+            <a:endParaRPr lang="en-US" sz="2600" i="0" dirty="0">
+              <a:solidFill>
+                <a:schemeClr val="tx1"/>
+              </a:solidFill>
+              <a:latin typeface="Calibri" pitchFamily="34" charset="0"/>
+              <a:cs typeface="+mj-cs"/>
+            </a:endParaRPr>
           </a:p>
         </p:txBody>
       </p:sp>
@@ -32217,8 +32811,115 @@
               <a:buChar char="•"/>
             </a:pPr>
             <a:r>
+              <a:rPr lang="en-US" altLang="zh-CN" dirty="0" err="1"/>
+              <a:t>TensileConv</a:t>
+            </a:r>
+            <a:r>
               <a:rPr lang="en-US" altLang="zh-CN" dirty="0"/>
-              <a:t>Support more ISA: Vega20… </a:t>
+              <a:t> could use as an independent Tool </a:t>
+            </a:r>
+          </a:p>
+          <a:p>
+            <a:pPr marL="722313" lvl="1" indent="-342900">
+              <a:buFont typeface="Arial" panose="020B0604020202020204" pitchFamily="34" charset="0"/>
+              <a:buChar char="•"/>
+            </a:pPr>
+            <a:r>
+              <a:rPr lang="en-US" altLang="zh-CN" dirty="0" err="1"/>
+              <a:t>TensileConv</a:t>
+            </a:r>
+            <a:r>
+              <a:rPr lang="en-US" altLang="zh-CN" dirty="0"/>
+              <a:t> also generate a static library that could easily port to other project </a:t>
+            </a:r>
+          </a:p>
+          <a:p>
+            <a:pPr marL="722313" lvl="1" indent="-342900">
+              <a:buFont typeface="Arial" panose="020B0604020202020204" pitchFamily="34" charset="0"/>
+              <a:buChar char="•"/>
+            </a:pPr>
+            <a:r>
+              <a:rPr lang="en-US" altLang="zh-CN" dirty="0" err="1"/>
+              <a:t>TensileConv</a:t>
+            </a:r>
+            <a:r>
+              <a:rPr lang="en-US" altLang="zh-CN" dirty="0"/>
+              <a:t> library offers very easy-using </a:t>
+            </a:r>
+            <a:r>
+              <a:rPr lang="en-US" altLang="zh-CN" dirty="0" err="1"/>
+              <a:t>c++</a:t>
+            </a:r>
+            <a:r>
+              <a:rPr lang="en-US" altLang="zh-CN" dirty="0"/>
+              <a:t> API</a:t>
+            </a:r>
+          </a:p>
+          <a:p>
+            <a:pPr marL="1179376" lvl="2" indent="-342900">
+              <a:buFont typeface="Arial" panose="020B0604020202020204" pitchFamily="34" charset="0"/>
+              <a:buChar char="•"/>
+            </a:pPr>
+            <a:r>
+              <a:rPr lang="en-US" altLang="zh-CN" dirty="0"/>
+              <a:t>Keeping a database for auto select tuning method </a:t>
+            </a:r>
+          </a:p>
+          <a:p>
+            <a:pPr marL="1636439" lvl="3" indent="-342900">
+              <a:buFont typeface="Arial" panose="020B0604020202020204" pitchFamily="34" charset="0"/>
+              <a:buChar char="•"/>
+            </a:pPr>
+            <a:r>
+              <a:rPr lang="en-US" altLang="zh-CN" dirty="0"/>
+              <a:t>Using best solution </a:t>
+            </a:r>
+            <a:r>
+              <a:rPr lang="en-US" altLang="zh-CN" dirty="0" err="1"/>
+              <a:t>keeped</a:t>
+            </a:r>
+            <a:r>
+              <a:rPr lang="en-US" altLang="zh-CN" dirty="0"/>
+              <a:t> in the database without searching </a:t>
+            </a:r>
+          </a:p>
+          <a:p>
+            <a:pPr marL="1636439" lvl="3" indent="-342900">
+              <a:buFont typeface="Arial" panose="020B0604020202020204" pitchFamily="34" charset="0"/>
+              <a:buChar char="•"/>
+            </a:pPr>
+            <a:r>
+              <a:rPr lang="en-US" altLang="zh-CN" dirty="0"/>
+              <a:t>User could chose </a:t>
+            </a:r>
+            <a:r>
+              <a:rPr lang="en-US" altLang="zh-CN" dirty="0" err="1"/>
+              <a:t>wether</a:t>
+            </a:r>
+            <a:r>
+              <a:rPr lang="en-US" altLang="zh-CN"/>
+              <a:t> to use brute-force or genetic algorithm searching method </a:t>
+            </a:r>
+            <a:endParaRPr lang="en-US" altLang="zh-CN" dirty="0"/>
+          </a:p>
+          <a:p>
+            <a:pPr marL="1636439" lvl="3" indent="-342900">
+              <a:buFont typeface="Arial" panose="020B0604020202020204" pitchFamily="34" charset="0"/>
+              <a:buChar char="•"/>
+            </a:pPr>
+            <a:r>
+              <a:rPr lang="en-US" altLang="zh-CN" dirty="0"/>
+              <a:t>Auto filter the bad performance parameter </a:t>
+            </a:r>
+          </a:p>
+          <a:p>
+            <a:pPr marL="1179376" lvl="2" indent="-342900">
+              <a:buFont typeface="Arial" panose="020B0604020202020204" pitchFamily="34" charset="0"/>
+              <a:buChar char="•"/>
+            </a:pPr>
+            <a:r>
+              <a:rPr lang="en-US" altLang="zh-CN" dirty="0"/>
+              <a:t>Result verification </a:t>
             </a:r>
           </a:p>
           <a:p>
@@ -32228,48 +32929,62 @@
             </a:pPr>
             <a:r>
               <a:rPr lang="en-US" altLang="zh-CN" dirty="0"/>
-              <a:t>Support more kernel size: 1x3 1x5 3x1…</a:t>
+              <a:t>This library has been used in Baidu Anakin project </a:t>
             </a:r>
           </a:p>
           <a:p>
-            <a:pPr marL="722313" lvl="1" indent="-342900">
-              <a:buFont typeface="Arial" panose="020B0604020202020204" pitchFamily="34" charset="0"/>
-              <a:buChar char="•"/>
-            </a:pPr>
+            <a:pPr marL="836476" lvl="2"/>
+            <a:endParaRPr lang="en-US" altLang="zh-CN" dirty="0"/>
+          </a:p>
+          <a:p>
+            <a:pPr marL="836476" lvl="2"/>
             <a:r>
               <a:rPr lang="en-US" altLang="zh-CN" dirty="0"/>
-              <a:t>Support more data type: fp16…</a:t>
+              <a:t>Example :</a:t>
             </a:r>
-          </a:p>
-          <a:p>
-            <a:pPr marL="722313" lvl="1" indent="-342900">
-              <a:buFont typeface="Arial" panose="020B0604020202020204" pitchFamily="34" charset="0"/>
-              <a:buChar char="•"/>
-            </a:pPr>
-            <a:r>
-              <a:rPr lang="en-US" dirty="0"/>
-              <a:t>More </a:t>
-            </a:r>
-            <a:r>
-              <a:rPr lang="en-US" altLang="zh-CN" dirty="0"/>
-              <a:t>kernel </a:t>
-            </a:r>
-            <a:r>
-              <a:rPr lang="en-US" dirty="0"/>
-              <a:t>tuning </a:t>
-            </a:r>
-            <a:r>
-              <a:rPr lang="en-US" altLang="zh-CN" dirty="0"/>
-              <a:t>parameter , prefetch method, tuning method  </a:t>
-            </a:r>
-            <a:endParaRPr lang="en-US" dirty="0"/>
           </a:p>
         </p:txBody>
       </p:sp>
+      <p:pic>
+        <p:nvPicPr>
+          <p:cNvPr id="3" name="Picture 2">
+            <a:extLst>
+              <a:ext uri="{FF2B5EF4-FFF2-40B4-BE49-F238E27FC236}">
+                <a16:creationId xmlns:a16="http://schemas.microsoft.com/office/drawing/2014/main" id="{2182E687-E7EB-4B7C-85AD-A10000E3F83A}"/>
+              </a:ext>
+            </a:extLst>
+          </p:cNvPr>
+          <p:cNvPicPr>
+            <a:picLocks noChangeAspect="1"/>
+          </p:cNvPicPr>
+          <p:nvPr/>
+        </p:nvPicPr>
+        <p:blipFill>
+          <a:blip r:embed="rId3">
+            <a:extLst>
+              <a:ext uri="{28A0092B-C50C-407E-A947-70E740481C1C}">
+                <a14:useLocalDpi xmlns:a14="http://schemas.microsoft.com/office/drawing/2010/main" val="0"/>
+              </a:ext>
+            </a:extLst>
+          </a:blip>
+          <a:stretch>
+            <a:fillRect/>
+          </a:stretch>
+        </p:blipFill>
+        <p:spPr>
+          <a:xfrm>
+            <a:off x="415088" y="3887107"/>
+            <a:ext cx="11773737" cy="638266"/>
+          </a:xfrm>
+          <a:prstGeom prst="rect">
+            <a:avLst/>
+          </a:prstGeom>
+        </p:spPr>
+      </p:pic>
     </p:spTree>
     <p:extLst>
       <p:ext uri="{BB962C8B-B14F-4D97-AF65-F5344CB8AC3E}">
-        <p14:creationId xmlns:p14="http://schemas.microsoft.com/office/powerpoint/2010/main" val="3055203463"/>
+        <p14:creationId xmlns:p14="http://schemas.microsoft.com/office/powerpoint/2010/main" val="3312491148"/>
       </p:ext>
     </p:extLst>
   </p:cSld>
@@ -32466,15 +33181,18 @@
                 <a:latin typeface="Calibri" pitchFamily="34" charset="0"/>
                 <a:cs typeface="+mj-cs"/>
               </a:rPr>
-              <a:t>Only for fun – remote GUI  </a:t>
+              <a:t>Future work  </a:t>
             </a:r>
-            <a:endParaRPr lang="en-US" sz="2600" i="0" dirty="0">
-              <a:solidFill>
-                <a:schemeClr val="tx1"/>
-              </a:solidFill>
-              <a:latin typeface="Calibri" pitchFamily="34" charset="0"/>
-              <a:cs typeface="+mj-cs"/>
-            </a:endParaRPr>
+            <a:r>
+              <a:rPr lang="en-US" sz="2600" i="0" dirty="0">
+                <a:solidFill>
+                  <a:schemeClr val="tx1"/>
+                </a:solidFill>
+                <a:latin typeface="Calibri" pitchFamily="34" charset="0"/>
+                <a:cs typeface="+mj-cs"/>
+              </a:rPr>
+              <a:t> </a:t>
+            </a:r>
           </a:p>
         </p:txBody>
       </p:sp>
@@ -32703,53 +33421,75 @@
               <a:buFont typeface="Arial" panose="020B0604020202020204" pitchFamily="34" charset="0"/>
               <a:buChar char="•"/>
             </a:pPr>
+            <a:r>
+              <a:rPr lang="en-US" altLang="zh-CN" dirty="0"/>
+              <a:t>Support more ISA: Vega20… </a:t>
+            </a:r>
+          </a:p>
+          <a:p>
+            <a:pPr marL="722313" lvl="1" indent="-342900">
+              <a:buFont typeface="Arial" panose="020B0604020202020204" pitchFamily="34" charset="0"/>
+              <a:buChar char="•"/>
+            </a:pPr>
+            <a:r>
+              <a:rPr lang="en-US" altLang="zh-CN" dirty="0"/>
+              <a:t>Support more operations: backward-weight, backward </a:t>
+            </a:r>
+            <a:r>
+              <a:rPr lang="en-US" altLang="zh-CN"/>
+              <a:t>data ,…   </a:t>
+            </a:r>
+            <a:endParaRPr lang="en-US" altLang="zh-CN" dirty="0"/>
+          </a:p>
+          <a:p>
+            <a:pPr marL="722313" lvl="1" indent="-342900">
+              <a:buFont typeface="Arial" panose="020B0604020202020204" pitchFamily="34" charset="0"/>
+              <a:buChar char="•"/>
+            </a:pPr>
+            <a:r>
+              <a:rPr lang="en-US" altLang="zh-CN" dirty="0"/>
+              <a:t>Support more kernel size: 1x3 1x5 3x1…</a:t>
+            </a:r>
+          </a:p>
+          <a:p>
+            <a:pPr marL="722313" lvl="1" indent="-342900">
+              <a:buFont typeface="Arial" panose="020B0604020202020204" pitchFamily="34" charset="0"/>
+              <a:buChar char="•"/>
+            </a:pPr>
+            <a:r>
+              <a:rPr lang="en-US" altLang="zh-CN" dirty="0"/>
+              <a:t>Support more data type: fp16…</a:t>
+            </a:r>
+          </a:p>
+          <a:p>
+            <a:pPr marL="722313" lvl="1" indent="-342900">
+              <a:buFont typeface="Arial" panose="020B0604020202020204" pitchFamily="34" charset="0"/>
+              <a:buChar char="•"/>
+            </a:pPr>
+            <a:r>
+              <a:rPr lang="en-US" dirty="0"/>
+              <a:t>More </a:t>
+            </a:r>
+            <a:r>
+              <a:rPr lang="en-US" altLang="zh-CN" dirty="0"/>
+              <a:t>kernel </a:t>
+            </a:r>
+            <a:r>
+              <a:rPr lang="en-US" dirty="0"/>
+              <a:t>tuning </a:t>
+            </a:r>
+            <a:r>
+              <a:rPr lang="en-US" altLang="zh-CN" dirty="0"/>
+              <a:t>parameter , prefetch method, tuning method  </a:t>
+            </a:r>
             <a:endParaRPr lang="en-US" dirty="0"/>
           </a:p>
         </p:txBody>
       </p:sp>
-      <p:pic>
-        <p:nvPicPr>
-          <p:cNvPr id="4" name="Picture 3" descr="TensileConvGUI">
-            <a:extLst>
-              <a:ext uri="{FF2B5EF4-FFF2-40B4-BE49-F238E27FC236}">
-                <a16:creationId xmlns:a16="http://schemas.microsoft.com/office/drawing/2014/main" id="{4CE1FCD0-30F0-46FD-93B6-D13B24D738ED}"/>
-              </a:ext>
-            </a:extLst>
-          </p:cNvPr>
-          <p:cNvPicPr/>
-          <p:nvPr/>
-        </p:nvPicPr>
-        <p:blipFill>
-          <a:blip r:embed="rId3" r:link="rId4">
-            <a:extLst>
-              <a:ext uri="{28A0092B-C50C-407E-A947-70E740481C1C}">
-                <a14:useLocalDpi xmlns:a14="http://schemas.microsoft.com/office/drawing/2010/main" val="0"/>
-              </a:ext>
-            </a:extLst>
-          </a:blip>
-          <a:srcRect/>
-          <a:stretch>
-            <a:fillRect/>
-          </a:stretch>
-        </p:blipFill>
-        <p:spPr bwMode="auto">
-          <a:xfrm>
-            <a:off x="1616292" y="1070072"/>
-            <a:ext cx="8272426" cy="4934801"/>
-          </a:xfrm>
-          <a:prstGeom prst="rect">
-            <a:avLst/>
-          </a:prstGeom>
-          <a:noFill/>
-          <a:ln>
-            <a:noFill/>
-          </a:ln>
-        </p:spPr>
-      </p:pic>
     </p:spTree>
     <p:extLst>
       <p:ext uri="{BB962C8B-B14F-4D97-AF65-F5344CB8AC3E}">
-        <p14:creationId xmlns:p14="http://schemas.microsoft.com/office/powerpoint/2010/main" val="824862506"/>
+        <p14:creationId xmlns:p14="http://schemas.microsoft.com/office/powerpoint/2010/main" val="1567604160"/>
       </p:ext>
     </p:extLst>
   </p:cSld>

</xml_diff>